<commit_message>
question input undo working
</commit_message>
<xml_diff>
--- a/SurveyTables.pptx
+++ b/SurveyTables.pptx
@@ -5,7 +5,7 @@
     <p:sldMasterId id="2147483648" r:id="rId1"/>
   </p:sldMasterIdLst>
   <p:notesMasterIdLst>
-    <p:notesMasterId r:id="rId10"/>
+    <p:notesMasterId r:id="rId11"/>
   </p:notesMasterIdLst>
   <p:sldIdLst>
     <p:sldId id="256" r:id="rId2"/>
@@ -16,6 +16,7 @@
     <p:sldId id="261" r:id="rId7"/>
     <p:sldId id="262" r:id="rId8"/>
     <p:sldId id="263" r:id="rId9"/>
+    <p:sldId id="264" r:id="rId10"/>
   </p:sldIdLst>
   <p:sldSz cx="12192000" cy="6858000"/>
   <p:notesSz cx="6858000" cy="9144000"/>
@@ -215,7 +216,7 @@
           <a:p>
             <a:fld id="{27983993-457D-4B44-87E0-F1832B9FDEA8}" type="datetimeFigureOut">
               <a:rPr lang="en-US" smtClean="0"/>
-              <a:t>5/24/25</a:t>
+              <a:t>6/10/25</a:t>
             </a:fld>
             <a:endParaRPr lang="en-US"/>
           </a:p>
@@ -1049,7 +1050,7 @@
           <a:p>
             <a:fld id="{3731B3E4-154A-8745-9F3C-ACEACDDEC42E}" type="datetimeFigureOut">
               <a:rPr lang="en-US" smtClean="0"/>
-              <a:t>5/24/25</a:t>
+              <a:t>6/10/25</a:t>
             </a:fld>
             <a:endParaRPr lang="en-US"/>
           </a:p>
@@ -1247,7 +1248,7 @@
           <a:p>
             <a:fld id="{3731B3E4-154A-8745-9F3C-ACEACDDEC42E}" type="datetimeFigureOut">
               <a:rPr lang="en-US" smtClean="0"/>
-              <a:t>5/24/25</a:t>
+              <a:t>6/10/25</a:t>
             </a:fld>
             <a:endParaRPr lang="en-US"/>
           </a:p>
@@ -1455,7 +1456,7 @@
           <a:p>
             <a:fld id="{3731B3E4-154A-8745-9F3C-ACEACDDEC42E}" type="datetimeFigureOut">
               <a:rPr lang="en-US" smtClean="0"/>
-              <a:t>5/24/25</a:t>
+              <a:t>6/10/25</a:t>
             </a:fld>
             <a:endParaRPr lang="en-US"/>
           </a:p>
@@ -1660,7 +1661,7 @@
           <a:p>
             <a:fld id="{3731B3E4-154A-8745-9F3C-ACEACDDEC42E}" type="datetimeFigureOut">
               <a:rPr lang="en-US" smtClean="0"/>
-              <a:t>5/24/25</a:t>
+              <a:t>6/10/25</a:t>
             </a:fld>
             <a:endParaRPr lang="en-US"/>
           </a:p>
@@ -1935,7 +1936,7 @@
           <a:p>
             <a:fld id="{3731B3E4-154A-8745-9F3C-ACEACDDEC42E}" type="datetimeFigureOut">
               <a:rPr lang="en-US" smtClean="0"/>
-              <a:t>5/24/25</a:t>
+              <a:t>6/10/25</a:t>
             </a:fld>
             <a:endParaRPr lang="en-US"/>
           </a:p>
@@ -2200,7 +2201,7 @@
           <a:p>
             <a:fld id="{3731B3E4-154A-8745-9F3C-ACEACDDEC42E}" type="datetimeFigureOut">
               <a:rPr lang="en-US" smtClean="0"/>
-              <a:t>5/24/25</a:t>
+              <a:t>6/10/25</a:t>
             </a:fld>
             <a:endParaRPr lang="en-US"/>
           </a:p>
@@ -2612,7 +2613,7 @@
           <a:p>
             <a:fld id="{3731B3E4-154A-8745-9F3C-ACEACDDEC42E}" type="datetimeFigureOut">
               <a:rPr lang="en-US" smtClean="0"/>
-              <a:t>5/24/25</a:t>
+              <a:t>6/10/25</a:t>
             </a:fld>
             <a:endParaRPr lang="en-US"/>
           </a:p>
@@ -2753,7 +2754,7 @@
           <a:p>
             <a:fld id="{3731B3E4-154A-8745-9F3C-ACEACDDEC42E}" type="datetimeFigureOut">
               <a:rPr lang="en-US" smtClean="0"/>
-              <a:t>5/24/25</a:t>
+              <a:t>6/10/25</a:t>
             </a:fld>
             <a:endParaRPr lang="en-US"/>
           </a:p>
@@ -2866,7 +2867,7 @@
           <a:p>
             <a:fld id="{3731B3E4-154A-8745-9F3C-ACEACDDEC42E}" type="datetimeFigureOut">
               <a:rPr lang="en-US" smtClean="0"/>
-              <a:t>5/24/25</a:t>
+              <a:t>6/10/25</a:t>
             </a:fld>
             <a:endParaRPr lang="en-US"/>
           </a:p>
@@ -3177,7 +3178,7 @@
           <a:p>
             <a:fld id="{3731B3E4-154A-8745-9F3C-ACEACDDEC42E}" type="datetimeFigureOut">
               <a:rPr lang="en-US" smtClean="0"/>
-              <a:t>5/24/25</a:t>
+              <a:t>6/10/25</a:t>
             </a:fld>
             <a:endParaRPr lang="en-US"/>
           </a:p>
@@ -3465,7 +3466,7 @@
           <a:p>
             <a:fld id="{3731B3E4-154A-8745-9F3C-ACEACDDEC42E}" type="datetimeFigureOut">
               <a:rPr lang="en-US" smtClean="0"/>
-              <a:t>5/24/25</a:t>
+              <a:t>6/10/25</a:t>
             </a:fld>
             <a:endParaRPr lang="en-US"/>
           </a:p>
@@ -3706,7 +3707,7 @@
           <a:p>
             <a:fld id="{3731B3E4-154A-8745-9F3C-ACEACDDEC42E}" type="datetimeFigureOut">
               <a:rPr lang="en-US" smtClean="0"/>
-              <a:t>5/24/25</a:t>
+              <a:t>6/10/25</a:t>
             </a:fld>
             <a:endParaRPr lang="en-US"/>
           </a:p>
@@ -15281,6 +15282,715 @@
     <p:extLst>
       <p:ext uri="{BB962C8B-B14F-4D97-AF65-F5344CB8AC3E}">
         <p14:creationId xmlns:p14="http://schemas.microsoft.com/office/powerpoint/2010/main" val="3668080093"/>
+      </p:ext>
+    </p:extLst>
+  </p:cSld>
+  <p:clrMapOvr>
+    <a:masterClrMapping/>
+  </p:clrMapOvr>
+</p:sld>
+</file>
+
+<file path=ppt/slides/slide9.xml><?xml version="1.0" encoding="utf-8"?>
+<p:sld xmlns:a="http://schemas.openxmlformats.org/drawingml/2006/main" xmlns:r="http://schemas.openxmlformats.org/officeDocument/2006/relationships" xmlns:p="http://schemas.openxmlformats.org/presentationml/2006/main">
+  <p:cSld>
+    <p:spTree>
+      <p:nvGrpSpPr>
+        <p:cNvPr id="1" name=""/>
+        <p:cNvGrpSpPr/>
+        <p:nvPr/>
+      </p:nvGrpSpPr>
+      <p:grpSpPr>
+        <a:xfrm>
+          <a:off x="0" y="0"/>
+          <a:ext cx="0" cy="0"/>
+          <a:chOff x="0" y="0"/>
+          <a:chExt cx="0" cy="0"/>
+        </a:xfrm>
+      </p:grpSpPr>
+      <p:graphicFrame>
+        <p:nvGraphicFramePr>
+          <p:cNvPr id="4" name="Table 3">
+            <a:extLst>
+              <a:ext uri="{FF2B5EF4-FFF2-40B4-BE49-F238E27FC236}">
+                <a16:creationId xmlns:a16="http://schemas.microsoft.com/office/drawing/2014/main" id="{D756D5B9-4CE9-2F4C-9753-F6B8565E0CF3}"/>
+              </a:ext>
+            </a:extLst>
+          </p:cNvPr>
+          <p:cNvGraphicFramePr>
+            <a:graphicFrameLocks noGrp="1"/>
+          </p:cNvGraphicFramePr>
+          <p:nvPr>
+            <p:extLst>
+              <p:ext uri="{D42A27DB-BD31-4B8C-83A1-F6EECF244321}">
+                <p14:modId xmlns:p14="http://schemas.microsoft.com/office/powerpoint/2010/main" val="3788593803"/>
+              </p:ext>
+            </p:extLst>
+          </p:nvPr>
+        </p:nvGraphicFramePr>
+        <p:xfrm>
+          <a:off x="1005840" y="737954"/>
+          <a:ext cx="10360152" cy="5034822"/>
+        </p:xfrm>
+        <a:graphic>
+          <a:graphicData uri="http://schemas.openxmlformats.org/drawingml/2006/table">
+            <a:tbl>
+              <a:tblPr firstRow="1" bandRow="1">
+                <a:tableStyleId>{5940675A-B579-460E-94D1-54222C63F5DA}</a:tableStyleId>
+              </a:tblPr>
+              <a:tblGrid>
+                <a:gridCol w="1508191">
+                  <a:extLst>
+                    <a:ext uri="{9D8B030D-6E8A-4147-A177-3AD203B41FA5}">
+                      <a16:colId xmlns:a16="http://schemas.microsoft.com/office/drawing/2014/main" val="809186182"/>
+                    </a:ext>
+                  </a:extLst>
+                </a:gridCol>
+                <a:gridCol w="2944937">
+                  <a:extLst>
+                    <a:ext uri="{9D8B030D-6E8A-4147-A177-3AD203B41FA5}">
+                      <a16:colId xmlns:a16="http://schemas.microsoft.com/office/drawing/2014/main" val="3233419091"/>
+                    </a:ext>
+                  </a:extLst>
+                </a:gridCol>
+                <a:gridCol w="2926080">
+                  <a:extLst>
+                    <a:ext uri="{9D8B030D-6E8A-4147-A177-3AD203B41FA5}">
+                      <a16:colId xmlns:a16="http://schemas.microsoft.com/office/drawing/2014/main" val="3293102844"/>
+                    </a:ext>
+                  </a:extLst>
+                </a:gridCol>
+                <a:gridCol w="2980944">
+                  <a:extLst>
+                    <a:ext uri="{9D8B030D-6E8A-4147-A177-3AD203B41FA5}">
+                      <a16:colId xmlns:a16="http://schemas.microsoft.com/office/drawing/2014/main" val="1583690605"/>
+                    </a:ext>
+                  </a:extLst>
+                </a:gridCol>
+              </a:tblGrid>
+              <a:tr h="633646">
+                <a:tc>
+                  <a:txBody>
+                    <a:bodyPr/>
+                    <a:lstStyle/>
+                    <a:p>
+                      <a:pPr algn="ctr"/>
+                      <a:endParaRPr lang="en-US" sz="1600" b="1" dirty="0"/>
+                    </a:p>
+                  </a:txBody>
+                  <a:tcPr/>
+                </a:tc>
+                <a:tc>
+                  <a:txBody>
+                    <a:bodyPr/>
+                    <a:lstStyle/>
+                    <a:p>
+                      <a:pPr algn="ctr"/>
+                      <a:r>
+                        <a:rPr lang="en-US" sz="1600" b="1" dirty="0"/>
+                        <a:t>key1</a:t>
+                      </a:r>
+                    </a:p>
+                  </a:txBody>
+                  <a:tcPr anchor="ctr"/>
+                </a:tc>
+                <a:tc>
+                  <a:txBody>
+                    <a:bodyPr/>
+                    <a:lstStyle/>
+                    <a:p>
+                      <a:pPr algn="ctr"/>
+                      <a:r>
+                        <a:rPr lang="en-US" sz="1600" b="1" dirty="0"/>
+                        <a:t>key2</a:t>
+                      </a:r>
+                    </a:p>
+                  </a:txBody>
+                  <a:tcPr anchor="ctr"/>
+                </a:tc>
+                <a:tc>
+                  <a:txBody>
+                    <a:bodyPr/>
+                    <a:lstStyle/>
+                    <a:p>
+                      <a:pPr algn="ctr"/>
+                      <a:r>
+                        <a:rPr lang="en-US" sz="1600" b="1" dirty="0"/>
+                        <a:t>options</a:t>
+                      </a:r>
+                    </a:p>
+                  </a:txBody>
+                  <a:tcPr anchor="ctr"/>
+                </a:tc>
+                <a:extLst>
+                  <a:ext uri="{0D108BD9-81ED-4DB2-BD59-A6C34878D82A}">
+                    <a16:rowId xmlns:a16="http://schemas.microsoft.com/office/drawing/2014/main" val="3568443477"/>
+                  </a:ext>
+                </a:extLst>
+              </a:tr>
+              <a:tr h="1149028">
+                <a:tc>
+                  <a:txBody>
+                    <a:bodyPr/>
+                    <a:lstStyle/>
+                    <a:p>
+                      <a:pPr algn="ctr"/>
+                      <a:r>
+                        <a:rPr lang="en-US" sz="1600" b="1" dirty="0"/>
+                        <a:t>---</a:t>
+                      </a:r>
+                    </a:p>
+                  </a:txBody>
+                  <a:tcPr anchor="ctr"/>
+                </a:tc>
+                <a:tc>
+                  <a:txBody>
+                    <a:bodyPr/>
+                    <a:lstStyle/>
+                    <a:p>
+                      <a:pPr algn="ctr"/>
+                      <a:r>
+                        <a:rPr lang="en-US" sz="1400" dirty="0"/>
+                        <a:t>Create new action</a:t>
+                      </a:r>
+                    </a:p>
+                    <a:p>
+                      <a:pPr algn="ctr"/>
+                      <a:r>
+                        <a:rPr lang="en-US" sz="1400" dirty="0"/>
+                        <a:t>Set key = key1</a:t>
+                      </a:r>
+                      <a:br>
+                        <a:rPr lang="en-US" sz="1400" dirty="0"/>
+                      </a:br>
+                      <a:r>
+                        <a:rPr lang="en-US" sz="1400" dirty="0"/>
+                        <a:t>Set new value = value1</a:t>
+                      </a:r>
+                    </a:p>
+                    <a:p>
+                      <a:pPr algn="ctr"/>
+                      <a:r>
+                        <a:rPr lang="en-US" sz="1400" dirty="0"/>
+                        <a:t>Add action to undo stack</a:t>
+                      </a:r>
+                    </a:p>
+                  </a:txBody>
+                  <a:tcPr anchor="ctr"/>
+                </a:tc>
+                <a:tc>
+                  <a:txBody>
+                    <a:bodyPr/>
+                    <a:lstStyle/>
+                    <a:p>
+                      <a:pPr algn="ctr"/>
+                      <a:r>
+                        <a:rPr lang="en-US" sz="1400" dirty="0"/>
+                        <a:t>Create new action</a:t>
+                      </a:r>
+                    </a:p>
+                    <a:p>
+                      <a:pPr algn="ctr"/>
+                      <a:r>
+                        <a:rPr lang="en-US" sz="1400" dirty="0"/>
+                        <a:t>Set key=  key2</a:t>
+                      </a:r>
+                      <a:br>
+                        <a:rPr lang="en-US" sz="1400" dirty="0"/>
+                      </a:br>
+                      <a:r>
+                        <a:rPr lang="en-US" sz="1400" dirty="0"/>
+                        <a:t>Set new value = value2</a:t>
+                      </a:r>
+                    </a:p>
+                    <a:p>
+                      <a:pPr algn="ctr"/>
+                      <a:r>
+                        <a:rPr lang="en-US" sz="1400" dirty="0"/>
+                        <a:t>Add action to undo stack</a:t>
+                      </a:r>
+                    </a:p>
+                    <a:p>
+                      <a:pPr algn="ctr"/>
+                      <a:endParaRPr lang="en-US" sz="1400" dirty="0"/>
+                    </a:p>
+                  </a:txBody>
+                  <a:tcPr anchor="ctr"/>
+                </a:tc>
+                <a:tc>
+                  <a:txBody>
+                    <a:bodyPr/>
+                    <a:lstStyle/>
+                    <a:p>
+                      <a:pPr algn="ctr"/>
+                      <a:r>
+                        <a:rPr lang="en-US" sz="1400" dirty="0"/>
+                        <a:t>Create </a:t>
+                      </a:r>
+                      <a:r>
+                        <a:rPr lang="en-US" sz="1400"/>
+                        <a:t>new action</a:t>
+                      </a:r>
+                    </a:p>
+                    <a:p>
+                      <a:pPr algn="ctr"/>
+                      <a:r>
+                        <a:rPr lang="en-US" sz="1400"/>
+                        <a:t>Set </a:t>
+                      </a:r>
+                      <a:r>
+                        <a:rPr lang="en-US" sz="1400" dirty="0"/>
+                        <a:t>key = options</a:t>
+                      </a:r>
+                      <a:br>
+                        <a:rPr lang="en-US" sz="1400" dirty="0"/>
+                      </a:br>
+                      <a:r>
+                        <a:rPr lang="en-US" sz="1400" dirty="0"/>
+                        <a:t>Set new value = selected options</a:t>
+                      </a:r>
+                    </a:p>
+                    <a:p>
+                      <a:pPr algn="ctr"/>
+                      <a:r>
+                        <a:rPr lang="en-US" sz="1400" dirty="0"/>
+                        <a:t>Add action to undo stack</a:t>
+                      </a:r>
+                    </a:p>
+                  </a:txBody>
+                  <a:tcPr anchor="ctr"/>
+                </a:tc>
+                <a:extLst>
+                  <a:ext uri="{0D108BD9-81ED-4DB2-BD59-A6C34878D82A}">
+                    <a16:rowId xmlns:a16="http://schemas.microsoft.com/office/drawing/2014/main" val="3143295767"/>
+                  </a:ext>
+                </a:extLst>
+              </a:tr>
+              <a:tr h="1149028">
+                <a:tc>
+                  <a:txBody>
+                    <a:bodyPr/>
+                    <a:lstStyle/>
+                    <a:p>
+                      <a:pPr algn="ctr"/>
+                      <a:r>
+                        <a:rPr lang="en-US" sz="1600" b="1" dirty="0"/>
+                        <a:t>key1</a:t>
+                      </a:r>
+                    </a:p>
+                  </a:txBody>
+                  <a:tcPr anchor="ctr"/>
+                </a:tc>
+                <a:tc>
+                  <a:txBody>
+                    <a:bodyPr/>
+                    <a:lstStyle/>
+                    <a:p>
+                      <a:pPr algn="ctr"/>
+                      <a:r>
+                        <a:rPr lang="en-US" sz="1400" dirty="0"/>
+                        <a:t>Update new value (value1)</a:t>
+                      </a:r>
+                    </a:p>
+                  </a:txBody>
+                  <a:tcPr anchor="ctr"/>
+                </a:tc>
+                <a:tc>
+                  <a:txBody>
+                    <a:bodyPr/>
+                    <a:lstStyle/>
+                    <a:p>
+                      <a:pPr algn="ctr"/>
+                      <a:r>
+                        <a:rPr lang="en-US" sz="1400" dirty="0"/>
+                        <a:t>Create new action</a:t>
+                      </a:r>
+                    </a:p>
+                    <a:p>
+                      <a:pPr algn="ctr"/>
+                      <a:r>
+                        <a:rPr lang="en-US" sz="1400" dirty="0"/>
+                        <a:t>Set key = key2</a:t>
+                      </a:r>
+                    </a:p>
+                    <a:p>
+                      <a:pPr algn="ctr"/>
+                      <a:r>
+                        <a:rPr lang="en-US" sz="1400" dirty="0"/>
+                        <a:t>Set new value = value2</a:t>
+                      </a:r>
+                    </a:p>
+                    <a:p>
+                      <a:pPr algn="ctr"/>
+                      <a:r>
+                        <a:rPr lang="en-US" sz="1400" dirty="0"/>
+                        <a:t>Add action to undo stack</a:t>
+                      </a:r>
+                    </a:p>
+                  </a:txBody>
+                  <a:tcPr anchor="ctr"/>
+                </a:tc>
+                <a:tc>
+                  <a:txBody>
+                    <a:bodyPr/>
+                    <a:lstStyle/>
+                    <a:p>
+                      <a:pPr algn="ctr"/>
+                      <a:r>
+                        <a:rPr lang="en-US" sz="1400" dirty="0"/>
+                        <a:t>Create new action</a:t>
+                      </a:r>
+                    </a:p>
+                    <a:p>
+                      <a:pPr algn="ctr"/>
+                      <a:r>
+                        <a:rPr lang="en-US" sz="1400" dirty="0"/>
+                        <a:t>Set key = options</a:t>
+                      </a:r>
+                    </a:p>
+                    <a:p>
+                      <a:pPr algn="ctr"/>
+                      <a:r>
+                        <a:rPr lang="en-US" sz="1400" dirty="0"/>
+                        <a:t>Set new value = selected options</a:t>
+                      </a:r>
+                    </a:p>
+                    <a:p>
+                      <a:pPr algn="ctr"/>
+                      <a:r>
+                        <a:rPr lang="en-US" sz="1400" dirty="0"/>
+                        <a:t>Add action to undo stack</a:t>
+                      </a:r>
+                    </a:p>
+                  </a:txBody>
+                  <a:tcPr anchor="ctr"/>
+                </a:tc>
+                <a:extLst>
+                  <a:ext uri="{0D108BD9-81ED-4DB2-BD59-A6C34878D82A}">
+                    <a16:rowId xmlns:a16="http://schemas.microsoft.com/office/drawing/2014/main" val="3905186887"/>
+                  </a:ext>
+                </a:extLst>
+              </a:tr>
+              <a:tr h="1149028">
+                <a:tc>
+                  <a:txBody>
+                    <a:bodyPr/>
+                    <a:lstStyle/>
+                    <a:p>
+                      <a:pPr algn="ctr"/>
+                      <a:r>
+                        <a:rPr lang="en-US" sz="1600" b="1" dirty="0"/>
+                        <a:t>key2</a:t>
+                      </a:r>
+                    </a:p>
+                  </a:txBody>
+                  <a:tcPr anchor="ctr"/>
+                </a:tc>
+                <a:tc>
+                  <a:txBody>
+                    <a:bodyPr/>
+                    <a:lstStyle/>
+                    <a:p>
+                      <a:pPr algn="ctr"/>
+                      <a:r>
+                        <a:rPr lang="en-US" sz="1400" dirty="0"/>
+                        <a:t>Create new action</a:t>
+                      </a:r>
+                    </a:p>
+                    <a:p>
+                      <a:pPr algn="ctr"/>
+                      <a:r>
+                        <a:rPr lang="en-US" sz="1400" dirty="0"/>
+                        <a:t>Set key = key1</a:t>
+                      </a:r>
+                    </a:p>
+                    <a:p>
+                      <a:pPr algn="ctr"/>
+                      <a:r>
+                        <a:rPr lang="en-US" sz="1400" dirty="0"/>
+                        <a:t>Set new value = value1</a:t>
+                      </a:r>
+                    </a:p>
+                    <a:p>
+                      <a:pPr algn="ctr"/>
+                      <a:r>
+                        <a:rPr lang="en-US" sz="1400" dirty="0"/>
+                        <a:t>Add action to undo stack</a:t>
+                      </a:r>
+                    </a:p>
+                  </a:txBody>
+                  <a:tcPr anchor="ctr"/>
+                </a:tc>
+                <a:tc>
+                  <a:txBody>
+                    <a:bodyPr/>
+                    <a:lstStyle/>
+                    <a:p>
+                      <a:pPr marL="0" marR="0" lvl="0" indent="0" algn="ctr" defTabSz="914400" rtl="0" eaLnBrk="1" fontAlgn="auto" latinLnBrk="0" hangingPunct="1">
+                        <a:lnSpc>
+                          <a:spcPct val="100000"/>
+                        </a:lnSpc>
+                        <a:spcBef>
+                          <a:spcPts val="0"/>
+                        </a:spcBef>
+                        <a:spcAft>
+                          <a:spcPts val="0"/>
+                        </a:spcAft>
+                        <a:buClrTx/>
+                        <a:buSzTx/>
+                        <a:buFontTx/>
+                        <a:buNone/>
+                        <a:tabLst/>
+                        <a:defRPr/>
+                      </a:pPr>
+                      <a:r>
+                        <a:rPr lang="en-US" sz="1400" dirty="0"/>
+                        <a:t>Update new value (value2)</a:t>
+                      </a:r>
+                    </a:p>
+                  </a:txBody>
+                  <a:tcPr anchor="ctr"/>
+                </a:tc>
+                <a:tc>
+                  <a:txBody>
+                    <a:bodyPr/>
+                    <a:lstStyle/>
+                    <a:p>
+                      <a:pPr algn="ctr"/>
+                      <a:r>
+                        <a:rPr lang="en-US" sz="1400" dirty="0"/>
+                        <a:t>Create new action</a:t>
+                      </a:r>
+                    </a:p>
+                    <a:p>
+                      <a:pPr algn="ctr"/>
+                      <a:r>
+                        <a:rPr lang="en-US" sz="1400" dirty="0"/>
+                        <a:t>Set key = options</a:t>
+                      </a:r>
+                    </a:p>
+                    <a:p>
+                      <a:pPr algn="ctr"/>
+                      <a:r>
+                        <a:rPr lang="en-US" sz="1400" dirty="0"/>
+                        <a:t>Set new value = selected options</a:t>
+                      </a:r>
+                    </a:p>
+                    <a:p>
+                      <a:pPr algn="ctr"/>
+                      <a:r>
+                        <a:rPr lang="en-US" sz="1400" dirty="0"/>
+                        <a:t>Add action to undo stack</a:t>
+                      </a:r>
+                    </a:p>
+                  </a:txBody>
+                  <a:tcPr anchor="ctr"/>
+                </a:tc>
+                <a:extLst>
+                  <a:ext uri="{0D108BD9-81ED-4DB2-BD59-A6C34878D82A}">
+                    <a16:rowId xmlns:a16="http://schemas.microsoft.com/office/drawing/2014/main" val="1198059137"/>
+                  </a:ext>
+                </a:extLst>
+              </a:tr>
+              <a:tr h="0">
+                <a:tc>
+                  <a:txBody>
+                    <a:bodyPr/>
+                    <a:lstStyle/>
+                    <a:p>
+                      <a:pPr algn="ctr"/>
+                      <a:r>
+                        <a:rPr lang="en-US" sz="1600" b="1" dirty="0"/>
+                        <a:t>options</a:t>
+                      </a:r>
+                    </a:p>
+                  </a:txBody>
+                  <a:tcPr anchor="ctr"/>
+                </a:tc>
+                <a:tc>
+                  <a:txBody>
+                    <a:bodyPr/>
+                    <a:lstStyle/>
+                    <a:p>
+                      <a:pPr algn="ctr"/>
+                      <a:r>
+                        <a:rPr lang="en-US" sz="1400" dirty="0"/>
+                        <a:t>Create new action</a:t>
+                      </a:r>
+                    </a:p>
+                    <a:p>
+                      <a:pPr algn="ctr"/>
+                      <a:r>
+                        <a:rPr lang="en-US" sz="1400" dirty="0"/>
+                        <a:t>Set key = key1</a:t>
+                      </a:r>
+                    </a:p>
+                    <a:p>
+                      <a:pPr algn="ctr"/>
+                      <a:r>
+                        <a:rPr lang="en-US" sz="1400" dirty="0"/>
+                        <a:t>Set new value = value1</a:t>
+                      </a:r>
+                    </a:p>
+                    <a:p>
+                      <a:pPr algn="ctr"/>
+                      <a:r>
+                        <a:rPr lang="en-US" sz="1400" dirty="0"/>
+                        <a:t>Add action to undo stack</a:t>
+                      </a:r>
+                    </a:p>
+                  </a:txBody>
+                  <a:tcPr anchor="ctr"/>
+                </a:tc>
+                <a:tc>
+                  <a:txBody>
+                    <a:bodyPr/>
+                    <a:lstStyle/>
+                    <a:p>
+                      <a:pPr algn="ctr"/>
+                      <a:r>
+                        <a:rPr lang="en-US" sz="1400" dirty="0"/>
+                        <a:t>Create new action</a:t>
+                      </a:r>
+                    </a:p>
+                    <a:p>
+                      <a:pPr algn="ctr"/>
+                      <a:r>
+                        <a:rPr lang="en-US" sz="1400" dirty="0"/>
+                        <a:t>Set key = key2</a:t>
+                      </a:r>
+                    </a:p>
+                    <a:p>
+                      <a:pPr algn="ctr"/>
+                      <a:r>
+                        <a:rPr lang="en-US" sz="1400" dirty="0"/>
+                        <a:t>Set new value = value2</a:t>
+                      </a:r>
+                    </a:p>
+                    <a:p>
+                      <a:pPr algn="ctr"/>
+                      <a:r>
+                        <a:rPr lang="en-US" sz="1400" dirty="0"/>
+                        <a:t>Add action to undo stack</a:t>
+                      </a:r>
+                    </a:p>
+                  </a:txBody>
+                  <a:tcPr anchor="ctr"/>
+                </a:tc>
+                <a:tc>
+                  <a:txBody>
+                    <a:bodyPr/>
+                    <a:lstStyle/>
+                    <a:p>
+                      <a:pPr marL="0" marR="0" lvl="0" indent="0" algn="ctr" defTabSz="914400" rtl="0" eaLnBrk="1" fontAlgn="auto" latinLnBrk="0" hangingPunct="1">
+                        <a:lnSpc>
+                          <a:spcPct val="100000"/>
+                        </a:lnSpc>
+                        <a:spcBef>
+                          <a:spcPts val="0"/>
+                        </a:spcBef>
+                        <a:spcAft>
+                          <a:spcPts val="0"/>
+                        </a:spcAft>
+                        <a:buClrTx/>
+                        <a:buSzTx/>
+                        <a:buFontTx/>
+                        <a:buNone/>
+                        <a:tabLst/>
+                        <a:defRPr/>
+                      </a:pPr>
+                      <a:r>
+                        <a:rPr lang="en-US" sz="1400" dirty="0"/>
+                        <a:t>Update new value (selected options)</a:t>
+                      </a:r>
+                    </a:p>
+                  </a:txBody>
+                  <a:tcPr anchor="ctr"/>
+                </a:tc>
+                <a:extLst>
+                  <a:ext uri="{0D108BD9-81ED-4DB2-BD59-A6C34878D82A}">
+                    <a16:rowId xmlns:a16="http://schemas.microsoft.com/office/drawing/2014/main" val="1869373145"/>
+                  </a:ext>
+                </a:extLst>
+              </a:tr>
+            </a:tbl>
+          </a:graphicData>
+        </a:graphic>
+      </p:graphicFrame>
+      <p:sp>
+        <p:nvSpPr>
+          <p:cNvPr id="5" name="TextBox 4">
+            <a:extLst>
+              <a:ext uri="{FF2B5EF4-FFF2-40B4-BE49-F238E27FC236}">
+                <a16:creationId xmlns:a16="http://schemas.microsoft.com/office/drawing/2014/main" id="{BCE43C6B-1C8F-514F-87AF-239FFA61519B}"/>
+              </a:ext>
+            </a:extLst>
+          </p:cNvPr>
+          <p:cNvSpPr txBox="1"/>
+          <p:nvPr/>
+        </p:nvSpPr>
+        <p:spPr>
+          <a:xfrm rot="16200000">
+            <a:off x="-263309" y="3337560"/>
+            <a:ext cx="1707134" cy="461665"/>
+          </a:xfrm>
+          <a:prstGeom prst="rect">
+            <a:avLst/>
+          </a:prstGeom>
+          <a:noFill/>
+        </p:spPr>
+        <p:txBody>
+          <a:bodyPr wrap="none" rtlCol="0">
+            <a:spAutoFit/>
+          </a:bodyPr>
+          <a:lstStyle/>
+          <a:p>
+            <a:r>
+              <a:rPr lang="en-US" sz="2400" b="1" dirty="0"/>
+              <a:t>Last Change</a:t>
+            </a:r>
+          </a:p>
+        </p:txBody>
+      </p:sp>
+      <p:sp>
+        <p:nvSpPr>
+          <p:cNvPr id="6" name="TextBox 5">
+            <a:extLst>
+              <a:ext uri="{FF2B5EF4-FFF2-40B4-BE49-F238E27FC236}">
+                <a16:creationId xmlns:a16="http://schemas.microsoft.com/office/drawing/2014/main" id="{A9C9ED1B-C30D-3543-B898-447057DB10D1}"/>
+              </a:ext>
+            </a:extLst>
+          </p:cNvPr>
+          <p:cNvSpPr txBox="1"/>
+          <p:nvPr/>
+        </p:nvSpPr>
+        <p:spPr>
+          <a:xfrm>
+            <a:off x="5204570" y="159910"/>
+            <a:ext cx="1782860" cy="461665"/>
+          </a:xfrm>
+          <a:prstGeom prst="rect">
+            <a:avLst/>
+          </a:prstGeom>
+          <a:noFill/>
+        </p:spPr>
+        <p:txBody>
+          <a:bodyPr wrap="none" rtlCol="0">
+            <a:spAutoFit/>
+          </a:bodyPr>
+          <a:lstStyle/>
+          <a:p>
+            <a:r>
+              <a:rPr lang="en-US" sz="2400" b="1" dirty="0"/>
+              <a:t>New Change</a:t>
+            </a:r>
+          </a:p>
+        </p:txBody>
+      </p:sp>
+    </p:spTree>
+    <p:extLst>
+      <p:ext uri="{BB962C8B-B14F-4D97-AF65-F5344CB8AC3E}">
+        <p14:creationId xmlns:p14="http://schemas.microsoft.com/office/powerpoint/2010/main" val="3253718418"/>
       </p:ext>
     </p:extLst>
   </p:cSld>

</xml_diff>

<commit_message>
select queries now use StringIDs
</commit_message>
<xml_diff>
--- a/SurveyTables.pptx
+++ b/SurveyTables.pptx
@@ -216,7 +216,7 @@
           <a:p>
             <a:fld id="{27983993-457D-4B44-87E0-F1832B9FDEA8}" type="datetimeFigureOut">
               <a:rPr lang="en-US" smtClean="0"/>
-              <a:t>6/15/25</a:t>
+              <a:t>6/25/25</a:t>
             </a:fld>
             <a:endParaRPr lang="en-US"/>
           </a:p>
@@ -1050,7 +1050,7 @@
           <a:p>
             <a:fld id="{3731B3E4-154A-8745-9F3C-ACEACDDEC42E}" type="datetimeFigureOut">
               <a:rPr lang="en-US" smtClean="0"/>
-              <a:t>6/15/25</a:t>
+              <a:t>6/25/25</a:t>
             </a:fld>
             <a:endParaRPr lang="en-US"/>
           </a:p>
@@ -1248,7 +1248,7 @@
           <a:p>
             <a:fld id="{3731B3E4-154A-8745-9F3C-ACEACDDEC42E}" type="datetimeFigureOut">
               <a:rPr lang="en-US" smtClean="0"/>
-              <a:t>6/15/25</a:t>
+              <a:t>6/25/25</a:t>
             </a:fld>
             <a:endParaRPr lang="en-US"/>
           </a:p>
@@ -1456,7 +1456,7 @@
           <a:p>
             <a:fld id="{3731B3E4-154A-8745-9F3C-ACEACDDEC42E}" type="datetimeFigureOut">
               <a:rPr lang="en-US" smtClean="0"/>
-              <a:t>6/15/25</a:t>
+              <a:t>6/25/25</a:t>
             </a:fld>
             <a:endParaRPr lang="en-US"/>
           </a:p>
@@ -1661,7 +1661,7 @@
           <a:p>
             <a:fld id="{3731B3E4-154A-8745-9F3C-ACEACDDEC42E}" type="datetimeFigureOut">
               <a:rPr lang="en-US" smtClean="0"/>
-              <a:t>6/15/25</a:t>
+              <a:t>6/25/25</a:t>
             </a:fld>
             <a:endParaRPr lang="en-US"/>
           </a:p>
@@ -1936,7 +1936,7 @@
           <a:p>
             <a:fld id="{3731B3E4-154A-8745-9F3C-ACEACDDEC42E}" type="datetimeFigureOut">
               <a:rPr lang="en-US" smtClean="0"/>
-              <a:t>6/15/25</a:t>
+              <a:t>6/25/25</a:t>
             </a:fld>
             <a:endParaRPr lang="en-US"/>
           </a:p>
@@ -2201,7 +2201,7 @@
           <a:p>
             <a:fld id="{3731B3E4-154A-8745-9F3C-ACEACDDEC42E}" type="datetimeFigureOut">
               <a:rPr lang="en-US" smtClean="0"/>
-              <a:t>6/15/25</a:t>
+              <a:t>6/25/25</a:t>
             </a:fld>
             <a:endParaRPr lang="en-US"/>
           </a:p>
@@ -2613,7 +2613,7 @@
           <a:p>
             <a:fld id="{3731B3E4-154A-8745-9F3C-ACEACDDEC42E}" type="datetimeFigureOut">
               <a:rPr lang="en-US" smtClean="0"/>
-              <a:t>6/15/25</a:t>
+              <a:t>6/25/25</a:t>
             </a:fld>
             <a:endParaRPr lang="en-US"/>
           </a:p>
@@ -2754,7 +2754,7 @@
           <a:p>
             <a:fld id="{3731B3E4-154A-8745-9F3C-ACEACDDEC42E}" type="datetimeFigureOut">
               <a:rPr lang="en-US" smtClean="0"/>
-              <a:t>6/15/25</a:t>
+              <a:t>6/25/25</a:t>
             </a:fld>
             <a:endParaRPr lang="en-US"/>
           </a:p>
@@ -2867,7 +2867,7 @@
           <a:p>
             <a:fld id="{3731B3E4-154A-8745-9F3C-ACEACDDEC42E}" type="datetimeFigureOut">
               <a:rPr lang="en-US" smtClean="0"/>
-              <a:t>6/15/25</a:t>
+              <a:t>6/25/25</a:t>
             </a:fld>
             <a:endParaRPr lang="en-US"/>
           </a:p>
@@ -3178,7 +3178,7 @@
           <a:p>
             <a:fld id="{3731B3E4-154A-8745-9F3C-ACEACDDEC42E}" type="datetimeFigureOut">
               <a:rPr lang="en-US" smtClean="0"/>
-              <a:t>6/15/25</a:t>
+              <a:t>6/25/25</a:t>
             </a:fld>
             <a:endParaRPr lang="en-US"/>
           </a:p>
@@ -3466,7 +3466,7 @@
           <a:p>
             <a:fld id="{3731B3E4-154A-8745-9F3C-ACEACDDEC42E}" type="datetimeFigureOut">
               <a:rPr lang="en-US" smtClean="0"/>
-              <a:t>6/15/25</a:t>
+              <a:t>6/25/25</a:t>
             </a:fld>
             <a:endParaRPr lang="en-US"/>
           </a:p>
@@ -3707,7 +3707,7 @@
           <a:p>
             <a:fld id="{3731B3E4-154A-8745-9F3C-ACEACDDEC42E}" type="datetimeFigureOut">
               <a:rPr lang="en-US" smtClean="0"/>
-              <a:t>6/15/25</a:t>
+              <a:t>6/25/25</a:t>
             </a:fld>
             <a:endParaRPr lang="en-US"/>
           </a:p>
@@ -5841,14 +5841,26 @@
           <a:p>
             <a:pPr algn="ctr"/>
             <a:r>
-              <a:rPr lang="en-US" sz="1400" dirty="0"/>
+              <a:rPr lang="en-US" sz="1400" dirty="0">
+                <a:solidFill>
+                  <a:schemeClr val="accent6">
+                    <a:lumMod val="75000"/>
+                  </a:schemeClr>
+                </a:solidFill>
+              </a:rPr>
               <a:t>name</a:t>
             </a:r>
           </a:p>
           <a:p>
             <a:pPr algn="ctr"/>
             <a:r>
-              <a:rPr lang="en-US" sz="1400" dirty="0"/>
+              <a:rPr lang="en-US" sz="1400" dirty="0">
+                <a:solidFill>
+                  <a:schemeClr val="accent6">
+                    <a:lumMod val="75000"/>
+                  </a:schemeClr>
+                </a:solidFill>
+              </a:rPr>
               <a:t>description</a:t>
             </a:r>
           </a:p>
@@ -6609,13 +6621,22 @@
           <a:p>
             <a:pPr algn="ctr"/>
             <a:r>
-              <a:rPr lang="en-US" sz="1400" dirty="0">
+              <a:rPr lang="en-US" sz="1400" dirty="0" err="1">
                 <a:solidFill>
-                  <a:schemeClr val="tx1"/>
+                  <a:schemeClr val="accent6">
+                    <a:lumMod val="75000"/>
+                  </a:schemeClr>
                 </a:solidFill>
               </a:rPr>
-              <a:t>text</a:t>
-            </a:r>
+              <a:t>text_sid</a:t>
+            </a:r>
+            <a:endParaRPr lang="en-US" sz="1400" dirty="0">
+              <a:solidFill>
+                <a:schemeClr val="accent6">
+                  <a:lumMod val="75000"/>
+                </a:schemeClr>
+              </a:solidFill>
+            </a:endParaRPr>
           </a:p>
         </p:txBody>
       </p:sp>
@@ -6704,7 +6725,7 @@
         <p:spPr>
           <a:xfrm>
             <a:off x="2885422" y="2303873"/>
-            <a:ext cx="908647" cy="738664"/>
+            <a:ext cx="1011046" cy="954107"/>
           </a:xfrm>
           <a:prstGeom prst="rect">
             <a:avLst/>
@@ -6735,7 +6756,19 @@
                   <a:schemeClr val="accent1"/>
                 </a:solidFill>
               </a:rPr>
-              <a:t>color = FK</a:t>
+              <a:t>blue = FK</a:t>
+            </a:r>
+          </a:p>
+          <a:p>
+            <a:r>
+              <a:rPr lang="en-US" sz="1400" dirty="0">
+                <a:solidFill>
+                  <a:schemeClr val="accent6">
+                    <a:lumMod val="75000"/>
+                  </a:schemeClr>
+                </a:solidFill>
+              </a:rPr>
+              <a:t>green = SID</a:t>
             </a:r>
           </a:p>
         </p:txBody>
@@ -7618,6 +7651,80 @@
           </a:fontRef>
         </p:style>
       </p:cxnSp>
+      <p:sp>
+        <p:nvSpPr>
+          <p:cNvPr id="31" name="Rectangle 30">
+            <a:extLst>
+              <a:ext uri="{FF2B5EF4-FFF2-40B4-BE49-F238E27FC236}">
+                <a16:creationId xmlns:a16="http://schemas.microsoft.com/office/drawing/2014/main" id="{15F77BCF-117A-614F-9D54-1BEDE9725F92}"/>
+              </a:ext>
+            </a:extLst>
+          </p:cNvPr>
+          <p:cNvSpPr/>
+          <p:nvPr/>
+        </p:nvSpPr>
+        <p:spPr>
+          <a:xfrm>
+            <a:off x="2746785" y="4060553"/>
+            <a:ext cx="1318178" cy="995844"/>
+          </a:xfrm>
+          <a:prstGeom prst="rect">
+            <a:avLst/>
+          </a:prstGeom>
+          <a:solidFill>
+            <a:srgbClr val="C7E9DF"/>
+          </a:solidFill>
+          <a:ln/>
+        </p:spPr>
+        <p:style>
+          <a:lnRef idx="1">
+            <a:schemeClr val="accent5"/>
+          </a:lnRef>
+          <a:fillRef idx="2">
+            <a:schemeClr val="accent5"/>
+          </a:fillRef>
+          <a:effectRef idx="1">
+            <a:schemeClr val="accent5"/>
+          </a:effectRef>
+          <a:fontRef idx="minor">
+            <a:schemeClr val="dk1"/>
+          </a:fontRef>
+        </p:style>
+        <p:txBody>
+          <a:bodyPr rtlCol="0" anchor="t"/>
+          <a:lstStyle/>
+          <a:p>
+            <a:pPr algn="ctr"/>
+            <a:r>
+              <a:rPr lang="en-US" b="1" dirty="0"/>
+              <a:t>Strings</a:t>
+            </a:r>
+          </a:p>
+          <a:p>
+            <a:pPr algn="ctr"/>
+            <a:r>
+              <a:rPr lang="en-US" sz="1400" b="1" dirty="0"/>
+              <a:t>id</a:t>
+            </a:r>
+          </a:p>
+          <a:p>
+            <a:pPr algn="ctr"/>
+            <a:r>
+              <a:rPr lang="en-US" sz="1400" dirty="0" err="1"/>
+              <a:t>str</a:t>
+            </a:r>
+            <a:endParaRPr lang="en-US" sz="1400" dirty="0"/>
+          </a:p>
+          <a:p>
+            <a:pPr algn="ctr"/>
+            <a:r>
+              <a:rPr lang="en-US" sz="1400" dirty="0" err="1"/>
+              <a:t>str_hash</a:t>
+            </a:r>
+            <a:endParaRPr lang="en-US" sz="1400" dirty="0"/>
+          </a:p>
+        </p:txBody>
+      </p:sp>
     </p:spTree>
     <p:extLst>
       <p:ext uri="{BB962C8B-B14F-4D97-AF65-F5344CB8AC3E}">
@@ -9197,9 +9304,10 @@
           <a:p>
             <a:pPr algn="ctr"/>
             <a:r>
-              <a:rPr lang="en-US" sz="1400" dirty="0"/>
-              <a:t>text</a:t>
-            </a:r>
+              <a:rPr lang="en-US" sz="1400" dirty="0" err="1"/>
+              <a:t>text_sid</a:t>
+            </a:r>
+            <a:endParaRPr lang="en-US" sz="1400" dirty="0"/>
           </a:p>
         </p:txBody>
       </p:sp>
@@ -9286,6 +9394,80 @@
               <a:rPr lang="en-US" sz="1200" dirty="0"/>
               <a:t> array</a:t>
             </a:r>
+          </a:p>
+        </p:txBody>
+      </p:sp>
+      <p:sp>
+        <p:nvSpPr>
+          <p:cNvPr id="40" name="Rectangle 39">
+            <a:extLst>
+              <a:ext uri="{FF2B5EF4-FFF2-40B4-BE49-F238E27FC236}">
+                <a16:creationId xmlns:a16="http://schemas.microsoft.com/office/drawing/2014/main" id="{D63332AB-5E38-684F-A120-125A825138A9}"/>
+              </a:ext>
+            </a:extLst>
+          </p:cNvPr>
+          <p:cNvSpPr/>
+          <p:nvPr/>
+        </p:nvSpPr>
+        <p:spPr>
+          <a:xfrm>
+            <a:off x="8743661" y="4329574"/>
+            <a:ext cx="1318178" cy="995844"/>
+          </a:xfrm>
+          <a:prstGeom prst="rect">
+            <a:avLst/>
+          </a:prstGeom>
+          <a:solidFill>
+            <a:srgbClr val="C7E9DF"/>
+          </a:solidFill>
+          <a:ln/>
+        </p:spPr>
+        <p:style>
+          <a:lnRef idx="1">
+            <a:schemeClr val="accent5"/>
+          </a:lnRef>
+          <a:fillRef idx="2">
+            <a:schemeClr val="accent5"/>
+          </a:fillRef>
+          <a:effectRef idx="1">
+            <a:schemeClr val="accent5"/>
+          </a:effectRef>
+          <a:fontRef idx="minor">
+            <a:schemeClr val="dk1"/>
+          </a:fontRef>
+        </p:style>
+        <p:txBody>
+          <a:bodyPr rtlCol="0" anchor="t"/>
+          <a:lstStyle/>
+          <a:p>
+            <a:pPr algn="ctr"/>
+            <a:r>
+              <a:rPr lang="en-US" b="1" dirty="0"/>
+              <a:t>Strings</a:t>
+            </a:r>
+          </a:p>
+          <a:p>
+            <a:pPr algn="ctr"/>
+            <a:r>
+              <a:rPr lang="en-US" sz="1400" b="1" dirty="0"/>
+              <a:t>id</a:t>
+            </a:r>
+          </a:p>
+          <a:p>
+            <a:pPr algn="ctr"/>
+            <a:r>
+              <a:rPr lang="en-US" sz="1400" dirty="0" err="1"/>
+              <a:t>str</a:t>
+            </a:r>
+            <a:endParaRPr lang="en-US" sz="1400" dirty="0"/>
+          </a:p>
+          <a:p>
+            <a:pPr algn="ctr"/>
+            <a:r>
+              <a:rPr lang="en-US" sz="1400" dirty="0" err="1"/>
+              <a:t>str_hash</a:t>
+            </a:r>
+            <a:endParaRPr lang="en-US" sz="1400" dirty="0"/>
           </a:p>
         </p:txBody>
       </p:sp>

</xml_diff>

<commit_message>
updated table to hold user responses
</commit_message>
<xml_diff>
--- a/SurveyTables.pptx
+++ b/SurveyTables.pptx
@@ -216,7 +216,7 @@
           <a:p>
             <a:fld id="{27983993-457D-4B44-87E0-F1832B9FDEA8}" type="datetimeFigureOut">
               <a:rPr lang="en-US" smtClean="0"/>
-              <a:t>6/25/25</a:t>
+              <a:t>10/12/25</a:t>
             </a:fld>
             <a:endParaRPr lang="en-US"/>
           </a:p>
@@ -1050,7 +1050,7 @@
           <a:p>
             <a:fld id="{3731B3E4-154A-8745-9F3C-ACEACDDEC42E}" type="datetimeFigureOut">
               <a:rPr lang="en-US" smtClean="0"/>
-              <a:t>6/25/25</a:t>
+              <a:t>10/12/25</a:t>
             </a:fld>
             <a:endParaRPr lang="en-US"/>
           </a:p>
@@ -1248,7 +1248,7 @@
           <a:p>
             <a:fld id="{3731B3E4-154A-8745-9F3C-ACEACDDEC42E}" type="datetimeFigureOut">
               <a:rPr lang="en-US" smtClean="0"/>
-              <a:t>6/25/25</a:t>
+              <a:t>10/12/25</a:t>
             </a:fld>
             <a:endParaRPr lang="en-US"/>
           </a:p>
@@ -1456,7 +1456,7 @@
           <a:p>
             <a:fld id="{3731B3E4-154A-8745-9F3C-ACEACDDEC42E}" type="datetimeFigureOut">
               <a:rPr lang="en-US" smtClean="0"/>
-              <a:t>6/25/25</a:t>
+              <a:t>10/12/25</a:t>
             </a:fld>
             <a:endParaRPr lang="en-US"/>
           </a:p>
@@ -1661,7 +1661,7 @@
           <a:p>
             <a:fld id="{3731B3E4-154A-8745-9F3C-ACEACDDEC42E}" type="datetimeFigureOut">
               <a:rPr lang="en-US" smtClean="0"/>
-              <a:t>6/25/25</a:t>
+              <a:t>10/12/25</a:t>
             </a:fld>
             <a:endParaRPr lang="en-US"/>
           </a:p>
@@ -1936,7 +1936,7 @@
           <a:p>
             <a:fld id="{3731B3E4-154A-8745-9F3C-ACEACDDEC42E}" type="datetimeFigureOut">
               <a:rPr lang="en-US" smtClean="0"/>
-              <a:t>6/25/25</a:t>
+              <a:t>10/12/25</a:t>
             </a:fld>
             <a:endParaRPr lang="en-US"/>
           </a:p>
@@ -2201,7 +2201,7 @@
           <a:p>
             <a:fld id="{3731B3E4-154A-8745-9F3C-ACEACDDEC42E}" type="datetimeFigureOut">
               <a:rPr lang="en-US" smtClean="0"/>
-              <a:t>6/25/25</a:t>
+              <a:t>10/12/25</a:t>
             </a:fld>
             <a:endParaRPr lang="en-US"/>
           </a:p>
@@ -2613,7 +2613,7 @@
           <a:p>
             <a:fld id="{3731B3E4-154A-8745-9F3C-ACEACDDEC42E}" type="datetimeFigureOut">
               <a:rPr lang="en-US" smtClean="0"/>
-              <a:t>6/25/25</a:t>
+              <a:t>10/12/25</a:t>
             </a:fld>
             <a:endParaRPr lang="en-US"/>
           </a:p>
@@ -2754,7 +2754,7 @@
           <a:p>
             <a:fld id="{3731B3E4-154A-8745-9F3C-ACEACDDEC42E}" type="datetimeFigureOut">
               <a:rPr lang="en-US" smtClean="0"/>
-              <a:t>6/25/25</a:t>
+              <a:t>10/12/25</a:t>
             </a:fld>
             <a:endParaRPr lang="en-US"/>
           </a:p>
@@ -2867,7 +2867,7 @@
           <a:p>
             <a:fld id="{3731B3E4-154A-8745-9F3C-ACEACDDEC42E}" type="datetimeFigureOut">
               <a:rPr lang="en-US" smtClean="0"/>
-              <a:t>6/25/25</a:t>
+              <a:t>10/12/25</a:t>
             </a:fld>
             <a:endParaRPr lang="en-US"/>
           </a:p>
@@ -3178,7 +3178,7 @@
           <a:p>
             <a:fld id="{3731B3E4-154A-8745-9F3C-ACEACDDEC42E}" type="datetimeFigureOut">
               <a:rPr lang="en-US" smtClean="0"/>
-              <a:t>6/25/25</a:t>
+              <a:t>10/12/25</a:t>
             </a:fld>
             <a:endParaRPr lang="en-US"/>
           </a:p>
@@ -3466,7 +3466,7 @@
           <a:p>
             <a:fld id="{3731B3E4-154A-8745-9F3C-ACEACDDEC42E}" type="datetimeFigureOut">
               <a:rPr lang="en-US" smtClean="0"/>
-              <a:t>6/25/25</a:t>
+              <a:t>10/12/25</a:t>
             </a:fld>
             <a:endParaRPr lang="en-US"/>
           </a:p>
@@ -3707,7 +3707,7 @@
           <a:p>
             <a:fld id="{3731B3E4-154A-8745-9F3C-ACEACDDEC42E}" type="datetimeFigureOut">
               <a:rPr lang="en-US" smtClean="0"/>
-              <a:t>6/25/25</a:t>
+              <a:t>10/12/25</a:t>
             </a:fld>
             <a:endParaRPr lang="en-US"/>
           </a:p>
@@ -5880,7 +5880,7 @@
         </p:nvSpPr>
         <p:spPr>
           <a:xfrm>
-            <a:off x="228087" y="5082968"/>
+            <a:off x="197802" y="3907672"/>
             <a:ext cx="1919026" cy="1445180"/>
           </a:xfrm>
           <a:prstGeom prst="rect">
@@ -6654,8 +6654,8 @@
         </p:nvSpPr>
         <p:spPr>
           <a:xfrm>
-            <a:off x="2677099" y="5158362"/>
-            <a:ext cx="4208443" cy="1384995"/>
+            <a:off x="4165160" y="5091614"/>
+            <a:ext cx="3697088" cy="1600438"/>
           </a:xfrm>
           <a:prstGeom prst="rect">
             <a:avLst/>
@@ -6689,8 +6689,8 @@
         </p:nvSpPr>
         <p:spPr>
           <a:xfrm>
-            <a:off x="7127135" y="5182120"/>
-            <a:ext cx="4208443" cy="1169551"/>
+            <a:off x="8297567" y="5091614"/>
+            <a:ext cx="3571345" cy="1384995"/>
           </a:xfrm>
           <a:prstGeom prst="rect">
             <a:avLst/>
@@ -7665,7 +7665,7 @@
         </p:nvSpPr>
         <p:spPr>
           <a:xfrm>
-            <a:off x="2746785" y="4060553"/>
+            <a:off x="2676919" y="3722889"/>
             <a:ext cx="1318178" cy="995844"/>
           </a:xfrm>
           <a:prstGeom prst="rect">
@@ -7722,6 +7722,117 @@
               <a:t>str_hash</a:t>
             </a:r>
             <a:endParaRPr lang="en-US" sz="1400" dirty="0"/>
+          </a:p>
+        </p:txBody>
+      </p:sp>
+      <p:sp>
+        <p:nvSpPr>
+          <p:cNvPr id="33" name="Rectangle 32">
+            <a:extLst>
+              <a:ext uri="{FF2B5EF4-FFF2-40B4-BE49-F238E27FC236}">
+                <a16:creationId xmlns:a16="http://schemas.microsoft.com/office/drawing/2014/main" id="{AF0CC0EE-DA44-B848-997A-967D00A67616}"/>
+              </a:ext>
+            </a:extLst>
+          </p:cNvPr>
+          <p:cNvSpPr/>
+          <p:nvPr/>
+        </p:nvSpPr>
+        <p:spPr>
+          <a:xfrm>
+            <a:off x="1153912" y="5412820"/>
+            <a:ext cx="1919026" cy="1445180"/>
+          </a:xfrm>
+          <a:prstGeom prst="rect">
+            <a:avLst/>
+          </a:prstGeom>
+          <a:gradFill flip="none" rotWithShape="1">
+            <a:gsLst>
+              <a:gs pos="0">
+                <a:schemeClr val="dk1">
+                  <a:lumMod val="67000"/>
+                </a:schemeClr>
+              </a:gs>
+              <a:gs pos="48000">
+                <a:schemeClr val="dk1">
+                  <a:lumMod val="97000"/>
+                  <a:lumOff val="3000"/>
+                </a:schemeClr>
+              </a:gs>
+              <a:gs pos="100000">
+                <a:schemeClr val="dk1">
+                  <a:lumMod val="60000"/>
+                  <a:lumOff val="40000"/>
+                </a:schemeClr>
+              </a:gs>
+            </a:gsLst>
+            <a:lin ang="16200000" scaled="1"/>
+            <a:tileRect/>
+          </a:gradFill>
+          <a:ln>
+            <a:noFill/>
+          </a:ln>
+        </p:spPr>
+        <p:style>
+          <a:lnRef idx="0">
+            <a:scrgbClr r="0" g="0" b="0"/>
+          </a:lnRef>
+          <a:fillRef idx="0">
+            <a:scrgbClr r="0" g="0" b="0"/>
+          </a:fillRef>
+          <a:effectRef idx="0">
+            <a:scrgbClr r="0" g="0" b="0"/>
+          </a:effectRef>
+          <a:fontRef idx="minor">
+            <a:schemeClr val="lt1"/>
+          </a:fontRef>
+        </p:style>
+        <p:txBody>
+          <a:bodyPr rtlCol="0" anchor="t"/>
+          <a:lstStyle/>
+          <a:p>
+            <a:pPr algn="ctr"/>
+            <a:r>
+              <a:rPr lang="en-US" dirty="0"/>
+              <a:t>Options</a:t>
+            </a:r>
+          </a:p>
+          <a:p>
+            <a:pPr algn="ctr"/>
+            <a:r>
+              <a:rPr lang="en-US" sz="1400" b="1" dirty="0" err="1"/>
+              <a:t>userid</a:t>
+            </a:r>
+            <a:endParaRPr lang="en-US" sz="1400" b="1" dirty="0"/>
+          </a:p>
+          <a:p>
+            <a:pPr algn="ctr"/>
+            <a:r>
+              <a:rPr lang="en-US" sz="1400" b="1" dirty="0" err="1"/>
+              <a:t>survey_id</a:t>
+            </a:r>
+            <a:endParaRPr lang="en-US" sz="1400" b="1" dirty="0"/>
+          </a:p>
+          <a:p>
+            <a:pPr algn="ctr"/>
+            <a:r>
+              <a:rPr lang="en-US" sz="1400" b="1" dirty="0" err="1"/>
+              <a:t>question_id</a:t>
+            </a:r>
+            <a:endParaRPr lang="en-US" sz="1400" b="1" dirty="0"/>
+          </a:p>
+          <a:p>
+            <a:pPr algn="ctr"/>
+            <a:r>
+              <a:rPr lang="en-US" sz="1400" b="1" dirty="0"/>
+              <a:t>status (draft/final)</a:t>
+            </a:r>
+          </a:p>
+          <a:p>
+            <a:pPr algn="ctr"/>
+            <a:r>
+              <a:rPr lang="en-US" sz="1400" dirty="0"/>
+              <a:t>…</a:t>
+            </a:r>
           </a:p>
         </p:txBody>
       </p:sp>

</xml_diff>